<commit_message>
- Các bài báo cáo
</commit_message>
<xml_diff>
--- a/Presents/Luongnv.Intro4.0.pptx
+++ b/Presents/Luongnv.Intro4.0.pptx
@@ -7503,7 +7503,7 @@
           </a:bodyPr>
           <a:lstStyle>
             <a:lvl1pPr algn="l">
-              <a:defRPr sz="3200" b="1"/>
+              <a:defRPr sz="2400" b="1"/>
             </a:lvl1pPr>
           </a:lstStyle>
           <a:p>
@@ -16651,7 +16651,7 @@
           <a:p>
             <a:pPr marL="514350" indent="-514350">
               <a:buFont typeface="+mj-lt"/>
-              <a:buAutoNum type="alphaUcPeriod"/>
+              <a:buAutoNum type="arabicPeriod"/>
             </a:pPr>
             <a:r>
               <a:rPr lang="en-US" dirty="0" err="1" smtClean="0"/>
@@ -16694,7 +16694,7 @@
           <a:p>
             <a:pPr marL="514350" indent="-514350">
               <a:buFont typeface="+mj-lt"/>
-              <a:buAutoNum type="alphaUcPeriod"/>
+              <a:buAutoNum type="arabicPeriod"/>
             </a:pPr>
             <a:r>
               <a:rPr lang="en-US" dirty="0" err="1" smtClean="0"/>
@@ -16729,7 +16729,7 @@
           <a:p>
             <a:pPr marL="514350" indent="-514350">
               <a:buFont typeface="+mj-lt"/>
-              <a:buAutoNum type="alphaUcPeriod"/>
+              <a:buAutoNum type="arabicPeriod"/>
             </a:pPr>
             <a:r>
               <a:rPr lang="en-US" dirty="0" err="1" smtClean="0"/>
@@ -16772,7 +16772,7 @@
           <a:p>
             <a:pPr marL="514350" indent="-514350">
               <a:buFont typeface="+mj-lt"/>
-              <a:buAutoNum type="alphaUcPeriod"/>
+              <a:buAutoNum type="arabicPeriod"/>
             </a:pPr>
             <a:r>
               <a:rPr lang="en-US" dirty="0" err="1" smtClean="0"/>
@@ -16831,7 +16831,7 @@
           <a:p>
             <a:pPr marL="514350" indent="-514350">
               <a:buFont typeface="+mj-lt"/>
-              <a:buAutoNum type="alphaUcPeriod"/>
+              <a:buAutoNum type="arabicPeriod"/>
             </a:pPr>
             <a:r>
               <a:rPr lang="en-US" dirty="0" smtClean="0"/>
@@ -21819,6 +21819,13 @@
   <p:clrMapOvr>
     <a:masterClrMapping/>
   </p:clrMapOvr>
+  <p:timing>
+    <p:tnLst>
+      <p:par>
+        <p:cTn id="1" dur="indefinite" restart="never" nodeType="tmRoot"/>
+      </p:par>
+    </p:tnLst>
+  </p:timing>
 </p:sld>
 </file>
 
@@ -23752,7 +23759,6 @@
               <a:rPr lang="en-US" sz="1600" i="1" dirty="0" smtClean="0"/>
               <a:t>)</a:t>
             </a:r>
-            <a:endParaRPr lang="en-US" sz="1600" i="1" dirty="0" smtClean="0"/>
           </a:p>
           <a:p>
             <a:pPr marL="285750" indent="-285750">
@@ -23869,6 +23875,13 @@
   <p:clrMapOvr>
     <a:masterClrMapping/>
   </p:clrMapOvr>
+  <p:timing>
+    <p:tnLst>
+      <p:par>
+        <p:cTn id="1" dur="indefinite" restart="never" nodeType="tmRoot"/>
+      </p:par>
+    </p:tnLst>
+  </p:timing>
 </p:sld>
 </file>
 
@@ -24398,103 +24411,103 @@
           <a:p>
             <a:pPr lvl="1"/>
             <a:r>
-              <a:rPr lang="en-US" dirty="0" smtClean="0"/>
+              <a:rPr lang="en-US" b="1" dirty="0" smtClean="0"/>
               <a:t>1 </a:t>
             </a:r>
             <a:r>
-              <a:rPr lang="en-US" dirty="0" err="1" smtClean="0"/>
+              <a:rPr lang="en-US" b="1" dirty="0" err="1" smtClean="0"/>
               <a:t>đường</a:t>
             </a:r>
             <a:r>
-              <a:rPr lang="en-US" dirty="0" smtClean="0"/>
-              <a:t> </a:t>
-            </a:r>
-            <a:r>
-              <a:rPr lang="en-US" dirty="0" err="1" smtClean="0"/>
+              <a:rPr lang="en-US" b="1" dirty="0" smtClean="0"/>
+              <a:t> </a:t>
+            </a:r>
+            <a:r>
+              <a:rPr lang="en-US" b="1" dirty="0" err="1" smtClean="0"/>
               <a:t>nữa</a:t>
             </a:r>
             <a:r>
-              <a:rPr lang="en-US" dirty="0" smtClean="0"/>
-              <a:t> </a:t>
-            </a:r>
-            <a:r>
-              <a:rPr lang="en-US" dirty="0" err="1" smtClean="0"/>
+              <a:rPr lang="en-US" b="1" dirty="0" smtClean="0"/>
+              <a:t> </a:t>
+            </a:r>
+            <a:r>
+              <a:rPr lang="en-US" b="1" dirty="0" err="1" smtClean="0"/>
               <a:t>là</a:t>
             </a:r>
             <a:r>
-              <a:rPr lang="en-US" dirty="0" smtClean="0"/>
-              <a:t> </a:t>
-            </a:r>
-            <a:r>
-              <a:rPr lang="en-US" dirty="0" err="1" smtClean="0"/>
+              <a:rPr lang="en-US" b="1" dirty="0" smtClean="0"/>
+              <a:t> </a:t>
+            </a:r>
+            <a:r>
+              <a:rPr lang="en-US" b="1" dirty="0" err="1" smtClean="0"/>
               <a:t>đường</a:t>
             </a:r>
             <a:r>
-              <a:rPr lang="en-US" dirty="0" smtClean="0"/>
+              <a:rPr lang="en-US" b="1" dirty="0" smtClean="0"/>
               <a:t> logical link + 1 </a:t>
             </a:r>
             <a:r>
-              <a:rPr lang="en-US" dirty="0" err="1" smtClean="0"/>
+              <a:rPr lang="en-US" b="1" dirty="0" err="1" smtClean="0"/>
               <a:t>điểm</a:t>
             </a:r>
             <a:r>
-              <a:rPr lang="en-US" dirty="0" smtClean="0"/>
-              <a:t> </a:t>
-            </a:r>
-            <a:r>
-              <a:rPr lang="en-US" dirty="0" err="1" smtClean="0"/>
+              <a:rPr lang="en-US" b="1" dirty="0" smtClean="0"/>
+              <a:t> </a:t>
+            </a:r>
+            <a:r>
+              <a:rPr lang="en-US" b="1" dirty="0" err="1" smtClean="0"/>
               <a:t>ngẫu</a:t>
             </a:r>
             <a:r>
-              <a:rPr lang="en-US" dirty="0" smtClean="0"/>
-              <a:t> </a:t>
-            </a:r>
-            <a:r>
-              <a:rPr lang="en-US" dirty="0" err="1" smtClean="0"/>
+              <a:rPr lang="en-US" b="1" dirty="0" smtClean="0"/>
+              <a:t> </a:t>
+            </a:r>
+            <a:r>
+              <a:rPr lang="en-US" b="1" dirty="0" err="1" smtClean="0"/>
               <a:t>nhiên</a:t>
             </a:r>
             <a:r>
-              <a:rPr lang="en-US" dirty="0" smtClean="0"/>
-              <a:t> </a:t>
-            </a:r>
-            <a:r>
-              <a:rPr lang="en-US" dirty="0" err="1" smtClean="0"/>
+              <a:rPr lang="en-US" b="1" dirty="0" smtClean="0"/>
+              <a:t> </a:t>
+            </a:r>
+            <a:r>
+              <a:rPr lang="en-US" b="1" dirty="0" err="1" smtClean="0"/>
               <a:t>trong</a:t>
             </a:r>
             <a:r>
-              <a:rPr lang="en-US" dirty="0" smtClean="0"/>
-              <a:t> </a:t>
-            </a:r>
-            <a:r>
-              <a:rPr lang="en-US" dirty="0" err="1" smtClean="0"/>
+              <a:rPr lang="en-US" b="1" dirty="0" smtClean="0"/>
+              <a:t> </a:t>
+            </a:r>
+            <a:r>
+              <a:rPr lang="en-US" b="1" dirty="0" err="1" smtClean="0"/>
               <a:t>các</a:t>
             </a:r>
             <a:r>
-              <a:rPr lang="en-US" dirty="0" smtClean="0"/>
-              <a:t> </a:t>
-            </a:r>
-            <a:r>
-              <a:rPr lang="en-US" dirty="0" err="1" smtClean="0"/>
+              <a:rPr lang="en-US" b="1" dirty="0" smtClean="0"/>
+              <a:t> </a:t>
+            </a:r>
+            <a:r>
+              <a:rPr lang="en-US" b="1" dirty="0" err="1" smtClean="0"/>
               <a:t>điểm</a:t>
             </a:r>
             <a:r>
-              <a:rPr lang="en-US" dirty="0" smtClean="0"/>
-              <a:t> </a:t>
-            </a:r>
-            <a:r>
-              <a:rPr lang="en-US" dirty="0" err="1" smtClean="0"/>
+              <a:rPr lang="en-US" b="1" dirty="0" smtClean="0"/>
+              <a:t> </a:t>
+            </a:r>
+            <a:r>
+              <a:rPr lang="en-US" b="1" dirty="0" err="1" smtClean="0"/>
               <a:t>còn</a:t>
             </a:r>
             <a:r>
-              <a:rPr lang="en-US" dirty="0" smtClean="0"/>
-              <a:t> </a:t>
-            </a:r>
-            <a:r>
-              <a:rPr lang="en-US" dirty="0" err="1" smtClean="0"/>
+              <a:rPr lang="en-US" b="1" dirty="0" smtClean="0"/>
+              <a:t> </a:t>
+            </a:r>
+            <a:r>
+              <a:rPr lang="en-US" b="1" dirty="0" err="1" smtClean="0"/>
               <a:t>lại</a:t>
             </a:r>
             <a:r>
-              <a:rPr lang="en-US" dirty="0" smtClean="0"/>
+              <a:rPr lang="en-US" b="1" dirty="0" smtClean="0"/>
               <a:t>. ID = 1;</a:t>
             </a:r>
           </a:p>
@@ -24583,6 +24596,13 @@
   <p:clrMapOvr>
     <a:masterClrMapping/>
   </p:clrMapOvr>
+  <p:timing>
+    <p:tnLst>
+      <p:par>
+        <p:cTn id="1" dur="indefinite" restart="never" nodeType="tmRoot"/>
+      </p:par>
+    </p:tnLst>
+  </p:timing>
 </p:sld>
 </file>
 
@@ -27643,16 +27663,12 @@
               <a:t>đi</a:t>
             </a:r>
             <a:r>
-              <a:rPr lang="en-US" sz="2400" smtClean="0">
+              <a:rPr lang="en-US" sz="2400" dirty="0" smtClean="0">
                 <a:latin typeface="Times New Roman" pitchFamily="18" charset="0"/>
                 <a:cs typeface="Times New Roman" pitchFamily="18" charset="0"/>
               </a:rPr>
               <a:t>)</a:t>
             </a:r>
-            <a:endParaRPr lang="en-US" sz="2400" dirty="0" smtClean="0">
-              <a:latin typeface="Times New Roman" pitchFamily="18" charset="0"/>
-              <a:cs typeface="Times New Roman" pitchFamily="18" charset="0"/>
-            </a:endParaRPr>
           </a:p>
         </p:txBody>
       </p:sp>
@@ -27943,8 +27959,16 @@
           <a:lstStyle/>
           <a:p>
             <a:r>
+              <a:rPr lang="en-US" sz="3600" dirty="0"/>
+              <a:t>1</a:t>
+            </a:r>
+            <a:r>
               <a:rPr lang="en-US" sz="3600" dirty="0" smtClean="0"/>
-              <a:t>A. CÁC KHÁI NIỆM CƠ BẢN	</a:t>
+              <a:t>. </a:t>
+            </a:r>
+            <a:r>
+              <a:rPr lang="en-US" sz="3600" dirty="0" smtClean="0"/>
+              <a:t>CÁC KHÁI NIỆM CƠ BẢN	</a:t>
             </a:r>
             <a:endParaRPr lang="en-US" sz="3600" dirty="0"/>
           </a:p>
@@ -27967,7 +27991,7 @@
           <a:p>
             <a:pPr marL="514350" indent="-514350">
               <a:buFont typeface="+mj-lt"/>
-              <a:buAutoNum type="arabicPeriod"/>
+              <a:buAutoNum type="alphaUcPeriod"/>
             </a:pPr>
             <a:r>
               <a:rPr lang="en-US" dirty="0" smtClean="0"/>
@@ -27977,7 +28001,7 @@
           <a:p>
             <a:pPr marL="514350" indent="-514350">
               <a:buFont typeface="+mj-lt"/>
-              <a:buAutoNum type="arabicPeriod"/>
+              <a:buAutoNum type="alphaUcPeriod"/>
             </a:pPr>
             <a:r>
               <a:rPr lang="en-US" dirty="0" smtClean="0"/>
@@ -27987,7 +28011,7 @@
           <a:p>
             <a:pPr marL="514350" indent="-514350">
               <a:buFont typeface="+mj-lt"/>
-              <a:buAutoNum type="arabicPeriod"/>
+              <a:buAutoNum type="alphaUcPeriod"/>
             </a:pPr>
             <a:r>
               <a:rPr lang="en-US" dirty="0" smtClean="0"/>
@@ -28002,7 +28026,7 @@
           <a:p>
             <a:pPr marL="514350" indent="-514350">
               <a:buFont typeface="+mj-lt"/>
-              <a:buAutoNum type="arabicPeriod"/>
+              <a:buAutoNum type="alphaUcPeriod"/>
             </a:pPr>
             <a:r>
               <a:rPr lang="en-US" dirty="0" smtClean="0"/>
@@ -36879,7 +36903,80 @@
               <a:rPr lang="en-US" dirty="0" smtClean="0"/>
               <a:t>.</a:t>
             </a:r>
-            <a:endParaRPr lang="en-US" dirty="0"/>
+          </a:p>
+          <a:p>
+            <a:r>
+              <a:rPr lang="en-US" dirty="0" err="1" smtClean="0"/>
+              <a:t>Dừng</a:t>
+            </a:r>
+            <a:r>
+              <a:rPr lang="en-US" dirty="0" smtClean="0"/>
+              <a:t> </a:t>
+            </a:r>
+            <a:r>
+              <a:rPr lang="en-US" dirty="0" err="1" smtClean="0"/>
+              <a:t>lại</a:t>
+            </a:r>
+            <a:r>
+              <a:rPr lang="en-US" dirty="0" smtClean="0"/>
+              <a:t> </a:t>
+            </a:r>
+            <a:r>
+              <a:rPr lang="en-US" dirty="0" err="1" smtClean="0"/>
+              <a:t>khi</a:t>
+            </a:r>
+            <a:r>
+              <a:rPr lang="en-US" dirty="0" smtClean="0"/>
+              <a:t> </a:t>
+            </a:r>
+            <a:r>
+              <a:rPr lang="en-US" dirty="0" err="1" smtClean="0"/>
+              <a:t>mà</a:t>
+            </a:r>
+            <a:r>
+              <a:rPr lang="en-US" dirty="0" smtClean="0"/>
+              <a:t> </a:t>
+            </a:r>
+            <a:r>
+              <a:rPr lang="en-US" dirty="0" err="1" smtClean="0"/>
+              <a:t>kết</a:t>
+            </a:r>
+            <a:r>
+              <a:rPr lang="en-US" dirty="0" smtClean="0"/>
+              <a:t> </a:t>
+            </a:r>
+            <a:r>
+              <a:rPr lang="en-US" dirty="0" err="1" smtClean="0"/>
+              <a:t>quả</a:t>
+            </a:r>
+            <a:r>
+              <a:rPr lang="en-US" dirty="0" smtClean="0"/>
+              <a:t> </a:t>
+            </a:r>
+            <a:r>
+              <a:rPr lang="en-US" dirty="0" err="1" smtClean="0"/>
+              <a:t>không</a:t>
+            </a:r>
+            <a:r>
+              <a:rPr lang="en-US" dirty="0" smtClean="0"/>
+              <a:t> </a:t>
+            </a:r>
+            <a:r>
+              <a:rPr lang="en-US" dirty="0" err="1" smtClean="0"/>
+              <a:t>tốt</a:t>
+            </a:r>
+            <a:r>
+              <a:rPr lang="en-US" dirty="0" smtClean="0"/>
+              <a:t> </a:t>
+            </a:r>
+            <a:r>
+              <a:rPr lang="en-US" dirty="0" err="1" smtClean="0"/>
+              <a:t>hơn</a:t>
+            </a:r>
+            <a:r>
+              <a:rPr lang="en-US" dirty="0"/>
+              <a:t>.</a:t>
+            </a:r>
           </a:p>
         </p:txBody>
       </p:sp>
@@ -38814,10 +38911,14 @@
           <a:lstStyle/>
           <a:p>
             <a:r>
-              <a:rPr lang="en-US" sz="2800" dirty="0" smtClean="0"/>
-              <a:t>1. DATA TRANSMISSION IN OPTICAL NETWORK</a:t>
-            </a:r>
-            <a:endParaRPr lang="en-US" sz="2800" dirty="0"/>
+              <a:rPr lang="en-US" sz="2400" dirty="0" smtClean="0"/>
+              <a:t>A. DATA </a:t>
+            </a:r>
+            <a:r>
+              <a:rPr lang="en-US" sz="2400" dirty="0" smtClean="0"/>
+              <a:t>TRANSMISSION IN OPTICAL NETWORK</a:t>
+            </a:r>
+            <a:endParaRPr lang="en-US" sz="2400" dirty="0"/>
           </a:p>
         </p:txBody>
       </p:sp>
@@ -39746,7 +39847,11 @@
           <a:p>
             <a:r>
               <a:rPr lang="en-US" sz="2800" dirty="0"/>
-              <a:t>1. DATA TRANSMISSION IN OPTICAL NETWORK</a:t>
+              <a:t>A. DATA </a:t>
+            </a:r>
+            <a:r>
+              <a:rPr lang="en-US" sz="2800" dirty="0"/>
+              <a:t>TRANSMISSION IN OPTICAL NETWORK</a:t>
             </a:r>
           </a:p>
         </p:txBody>
@@ -39811,8 +39916,12 @@
           <a:lstStyle/>
           <a:p>
             <a:r>
+              <a:rPr lang="en-US" sz="2800" dirty="0" smtClean="0"/>
+              <a:t>DATA </a:t>
+            </a:r>
+            <a:r>
               <a:rPr lang="en-US" sz="2800" dirty="0"/>
-              <a:t>1. DATA TRANSMISSION IN OPTICAL NETWORK</a:t>
+              <a:t>TRANSMISSION IN OPTICAL NETWORK</a:t>
             </a:r>
           </a:p>
         </p:txBody>

</xml_diff>